<commit_message>
Update Conferencia 1 - Computadoras y Lenguajes de Programación.pptx
piecewise translation QA changes
</commit_message>
<xml_diff>
--- a/Computer Science Principles/Lectures/Translated/Spanish/Conferencia 1 - Computadoras y Lenguajes de Programación.pptx
+++ b/Computer Science Principles/Lectures/Translated/Spanish/Conferencia 1 - Computadoras y Lenguajes de Programación.pptx
@@ -120,6 +120,103 @@
     </p:ext>
   </p:extLst>
 </p:presentation>
+</file>
+
+<file path=ppt/changesInfos/changesInfo1.xml><?xml version="1.0" encoding="utf-8"?>
+<pc:chgInfo xmlns:a="http://schemas.openxmlformats.org/drawingml/2006/main" xmlns:r="http://schemas.openxmlformats.org/officeDocument/2006/relationships" xmlns:ac="http://schemas.microsoft.com/office/drawing/2013/main/command" xmlns:pc="http://schemas.microsoft.com/office/powerpoint/2013/main/command">
+  <pc:docChgLst>
+    <pc:chgData name="Joshua Gross" userId="7bb6a70e-9d37-46e4-96de-748557707bd0" providerId="ADAL" clId="{DAF3FC5C-F0CE-4779-9465-1F3477196514}"/>
+    <pc:docChg chg="modSld">
+      <pc:chgData name="Joshua Gross" userId="7bb6a70e-9d37-46e4-96de-748557707bd0" providerId="ADAL" clId="{DAF3FC5C-F0CE-4779-9465-1F3477196514}" dt="2023-09-12T12:46:39.840" v="36"/>
+      <pc:docMkLst>
+        <pc:docMk/>
+      </pc:docMkLst>
+      <pc:sldChg chg="modSp">
+        <pc:chgData name="Joshua Gross" userId="7bb6a70e-9d37-46e4-96de-748557707bd0" providerId="ADAL" clId="{DAF3FC5C-F0CE-4779-9465-1F3477196514}" dt="2023-09-12T12:43:28.545" v="0"/>
+        <pc:sldMkLst>
+          <pc:docMk/>
+          <pc:sldMk cId="294718848" sldId="259"/>
+        </pc:sldMkLst>
+        <pc:spChg chg="mod">
+          <ac:chgData name="Joshua Gross" userId="7bb6a70e-9d37-46e4-96de-748557707bd0" providerId="ADAL" clId="{DAF3FC5C-F0CE-4779-9465-1F3477196514}" dt="2023-09-12T12:43:28.545" v="0"/>
+          <ac:spMkLst>
+            <pc:docMk/>
+            <pc:sldMk cId="294718848" sldId="259"/>
+            <ac:spMk id="3" creationId="{0DA003E7-CFC4-48B7-B5F5-744AA9A85CC6}"/>
+          </ac:spMkLst>
+        </pc:spChg>
+      </pc:sldChg>
+      <pc:sldChg chg="modSp">
+        <pc:chgData name="Joshua Gross" userId="7bb6a70e-9d37-46e4-96de-748557707bd0" providerId="ADAL" clId="{DAF3FC5C-F0CE-4779-9465-1F3477196514}" dt="2023-09-12T12:44:01.072" v="1"/>
+        <pc:sldMkLst>
+          <pc:docMk/>
+          <pc:sldMk cId="3419807359" sldId="260"/>
+        </pc:sldMkLst>
+        <pc:spChg chg="mod">
+          <ac:chgData name="Joshua Gross" userId="7bb6a70e-9d37-46e4-96de-748557707bd0" providerId="ADAL" clId="{DAF3FC5C-F0CE-4779-9465-1F3477196514}" dt="2023-09-12T12:44:01.072" v="1"/>
+          <ac:spMkLst>
+            <pc:docMk/>
+            <pc:sldMk cId="3419807359" sldId="260"/>
+            <ac:spMk id="2" creationId="{75731F22-D743-4DC2-86E4-40EE2E8D30C7}"/>
+          </ac:spMkLst>
+        </pc:spChg>
+      </pc:sldChg>
+      <pc:sldChg chg="modSp">
+        <pc:chgData name="Joshua Gross" userId="7bb6a70e-9d37-46e4-96de-748557707bd0" providerId="ADAL" clId="{DAF3FC5C-F0CE-4779-9465-1F3477196514}" dt="2023-09-12T12:45:00.323" v="34" actId="20577"/>
+        <pc:sldMkLst>
+          <pc:docMk/>
+          <pc:sldMk cId="3748963717" sldId="261"/>
+        </pc:sldMkLst>
+        <pc:spChg chg="mod">
+          <ac:chgData name="Joshua Gross" userId="7bb6a70e-9d37-46e4-96de-748557707bd0" providerId="ADAL" clId="{DAF3FC5C-F0CE-4779-9465-1F3477196514}" dt="2023-09-12T12:45:00.323" v="34" actId="20577"/>
+          <ac:spMkLst>
+            <pc:docMk/>
+            <pc:sldMk cId="3748963717" sldId="261"/>
+            <ac:spMk id="4" creationId="{CD4D9443-200A-4BD0-8056-142B9513C4E3}"/>
+          </ac:spMkLst>
+        </pc:spChg>
+        <pc:spChg chg="mod">
+          <ac:chgData name="Joshua Gross" userId="7bb6a70e-9d37-46e4-96de-748557707bd0" providerId="ADAL" clId="{DAF3FC5C-F0CE-4779-9465-1F3477196514}" dt="2023-09-12T12:44:58.283" v="32" actId="20577"/>
+          <ac:spMkLst>
+            <pc:docMk/>
+            <pc:sldMk cId="3748963717" sldId="261"/>
+            <ac:spMk id="5" creationId="{37BED913-370E-49DB-88D6-456CA4A61A77}"/>
+          </ac:spMkLst>
+        </pc:spChg>
+      </pc:sldChg>
+      <pc:sldChg chg="modSp">
+        <pc:chgData name="Joshua Gross" userId="7bb6a70e-9d37-46e4-96de-748557707bd0" providerId="ADAL" clId="{DAF3FC5C-F0CE-4779-9465-1F3477196514}" dt="2023-09-12T12:46:11.688" v="35"/>
+        <pc:sldMkLst>
+          <pc:docMk/>
+          <pc:sldMk cId="1029681739" sldId="264"/>
+        </pc:sldMkLst>
+        <pc:spChg chg="mod">
+          <ac:chgData name="Joshua Gross" userId="7bb6a70e-9d37-46e4-96de-748557707bd0" providerId="ADAL" clId="{DAF3FC5C-F0CE-4779-9465-1F3477196514}" dt="2023-09-12T12:46:11.688" v="35"/>
+          <ac:spMkLst>
+            <pc:docMk/>
+            <pc:sldMk cId="1029681739" sldId="264"/>
+            <ac:spMk id="3" creationId="{12F731AC-3A92-4F4F-B35C-836CD58FFD06}"/>
+          </ac:spMkLst>
+        </pc:spChg>
+      </pc:sldChg>
+      <pc:sldChg chg="modSp">
+        <pc:chgData name="Joshua Gross" userId="7bb6a70e-9d37-46e4-96de-748557707bd0" providerId="ADAL" clId="{DAF3FC5C-F0CE-4779-9465-1F3477196514}" dt="2023-09-12T12:46:39.840" v="36"/>
+        <pc:sldMkLst>
+          <pc:docMk/>
+          <pc:sldMk cId="4278055811" sldId="265"/>
+        </pc:sldMkLst>
+        <pc:spChg chg="mod">
+          <ac:chgData name="Joshua Gross" userId="7bb6a70e-9d37-46e4-96de-748557707bd0" providerId="ADAL" clId="{DAF3FC5C-F0CE-4779-9465-1F3477196514}" dt="2023-09-12T12:46:39.840" v="36"/>
+          <ac:spMkLst>
+            <pc:docMk/>
+            <pc:sldMk cId="4278055811" sldId="265"/>
+            <ac:spMk id="3" creationId="{12F731AC-3A92-4F4F-B35C-836CD58FFD06}"/>
+          </ac:spMkLst>
+        </pc:spChg>
+      </pc:sldChg>
+    </pc:docChg>
+  </pc:docChgLst>
+</pc:chgInfo>
 </file>
 
 <file path=ppt/slideLayouts/slideLayout1.xml><?xml version="1.0" encoding="utf-8"?>
@@ -3498,7 +3595,7 @@
           <a:p>
             <a:r>
               <a:rPr lang="es-ES" dirty="0"/>
-              <a:t>Ahora, traduzca cada paso en el algoritmo inglés a un lenguaje de programación (Java)</a:t>
+              <a:t>Ahora, traduzca cada paso en el algoritmo Español a un lenguaje de programación (Java)</a:t>
             </a:r>
             <a:br>
               <a:rPr lang="es-ES" dirty="0"/>
@@ -3913,7 +4010,7 @@
           <a:lstStyle/>
           <a:p>
             <a:r>
-              <a:rPr lang="es-ES"/>
+              <a:rPr lang="es-ES" dirty="0"/>
               <a:t>Ordenador: recopilación de componentes hardware que nos permiten cambiar datos
 Los componentes de hardware utilizan electricidad para cambiar los datos
 La electricidad puede estar presente o no presente
@@ -4248,8 +4345,16 @@
           <a:lstStyle/>
           <a:p>
             <a:r>
-              <a:rPr lang="en-US"/>
-              <a:t>Texto legible por humanos</a:t>
+              <a:rPr lang="en-US" dirty="0" err="1"/>
+              <a:t>Texto</a:t>
+            </a:r>
+            <a:r>
+              <a:rPr lang="en-US" dirty="0"/>
+              <a:t> legible por </a:t>
+            </a:r>
+            <a:r>
+              <a:rPr lang="en-US" dirty="0" err="1"/>
+              <a:t>humanos</a:t>
             </a:r>
             <a:endParaRPr lang="en-US" dirty="0"/>
           </a:p>
@@ -4396,8 +4501,16 @@
           <a:lstStyle/>
           <a:p>
             <a:r>
-              <a:rPr lang="en-US"/>
-              <a:t>Binario legible por computadora</a:t>
+              <a:rPr lang="en-US" dirty="0" err="1"/>
+              <a:t>Binario</a:t>
+            </a:r>
+            <a:r>
+              <a:rPr lang="en-US" dirty="0"/>
+              <a:t> legible por </a:t>
+            </a:r>
+            <a:r>
+              <a:rPr lang="en-US" dirty="0" err="1"/>
+              <a:t>computadora</a:t>
             </a:r>
             <a:endParaRPr lang="en-US" dirty="0"/>
           </a:p>
@@ -4455,7 +4568,7 @@
           <a:lstStyle/>
           <a:p>
             <a:r>
-              <a:rPr lang="es-ES"/>
+              <a:rPr lang="es-ES" dirty="0"/>
               <a:t>¿Qué es un lenguaje de programación?</a:t>
             </a:r>
             <a:endParaRPr lang="en-US" dirty="0"/>
@@ -4546,7 +4659,7 @@
           <a:lstStyle/>
           <a:p>
             <a:r>
-              <a:rPr lang="es-ES" sz="3200"/>
+              <a:rPr lang="es-ES" sz="3200" dirty="0"/>
               <a:t>Similitudes entre programación y lenguajes naturales</a:t>
             </a:r>
             <a:endParaRPr lang="en-US" sz="3200" dirty="0"/>
@@ -4887,7 +5000,7 @@
             </a:r>
             <a:r>
               <a:rPr lang="en-US" sz="2000" dirty="0"/>
-              <a:t>(“Hello, World”);</a:t>
+              <a:t>(“Hola, Mundo”);</a:t>
             </a:r>
           </a:p>
           <a:p>
@@ -4901,19 +5014,19 @@
             </a:r>
             <a:r>
               <a:rPr lang="en-US" sz="2000" dirty="0"/>
-              <a:t>(“Hello, World”);</a:t>
+              <a:t>(“Hola, Mundo”);</a:t>
             </a:r>
           </a:p>
           <a:p>
             <a:r>
               <a:rPr lang="en-US" sz="2000" dirty="0"/>
-              <a:t>Python: print(“Hello, World”);</a:t>
+              <a:t>Python: print(“Hola, Mundo”);</a:t>
             </a:r>
           </a:p>
           <a:p>
             <a:r>
               <a:rPr lang="en-US" sz="2000" dirty="0"/>
-              <a:t>JavaScript: console.log(“Hello, World”);</a:t>
+              <a:t>JavaScript: console.log(“Hola, Mundo”);</a:t>
             </a:r>
           </a:p>
         </p:txBody>
@@ -4979,7 +5092,7 @@
                   <a:schemeClr val="tx1"/>
                 </a:solidFill>
               </a:rPr>
-              <a:t>Hello, World</a:t>
+              <a:t>Hola, Mundo</a:t>
             </a:r>
           </a:p>
         </p:txBody>
@@ -5162,7 +5275,7 @@
           <a:lstStyle/>
           <a:p>
             <a:r>
-              <a:rPr lang="es-ES"/>
+              <a:rPr lang="es-ES" dirty="0"/>
               <a:t>Conexión de la programación a algoritmos</a:t>
             </a:r>
             <a:endParaRPr lang="en-US" dirty="0"/>
@@ -5439,7 +5552,7 @@
             </a:pPr>
             <a:r>
               <a:rPr lang="es-ES" dirty="0"/>
-              <a:t>Escriba mi nombre y guárdelo en el equipo
+              <a:t>Escriba mi nombre y guárdelo en la computadora
 El ordenador muestra mi nombre</a:t>
             </a:r>
             <a:endParaRPr lang="en-US" dirty="0"/>
@@ -5764,12 +5877,6 @@
 </file>
 
 <file path=customXml/item2.xml><?xml version="1.0" encoding="utf-8"?>
-<p:properties xmlns:p="http://schemas.microsoft.com/office/2006/metadata/properties" xmlns:xsi="http://www.w3.org/2001/XMLSchema-instance" xmlns:pc="http://schemas.microsoft.com/office/infopath/2007/PartnerControls">
-  <documentManagement/>
-</p:properties>
-</file>
-
-<file path=customXml/item3.xml><?xml version="1.0" encoding="utf-8"?>
 <ct:contentTypeSchema xmlns:ct="http://schemas.microsoft.com/office/2006/metadata/contentType" xmlns:ma="http://schemas.microsoft.com/office/2006/metadata/properties/metaAttributes" ct:_="" ma:_="" ma:contentTypeName="Document" ma:contentTypeID="0x010100560B5B77A830FC46B2AE00BAF7D52A54" ma:contentTypeVersion="7" ma:contentTypeDescription="Create a new document." ma:contentTypeScope="" ma:versionID="b4505af7389e3055bf286c471b435ab2">
   <xsd:schema xmlns:xsd="http://www.w3.org/2001/XMLSchema" xmlns:xs="http://www.w3.org/2001/XMLSchema" xmlns:p="http://schemas.microsoft.com/office/2006/metadata/properties" xmlns:ns3="8c07c512-1ff3-44bd-87df-82ef976e112f" targetNamespace="http://schemas.microsoft.com/office/2006/metadata/properties" ma:root="true" ma:fieldsID="6f058549addda5694cbd4e31095b42cb" ns3:_="">
     <xsd:import namespace="8c07c512-1ff3-44bd-87df-82ef976e112f"/>
@@ -5931,6 +6038,12 @@
 </ct:contentTypeSchema>
 </file>
 
+<file path=customXml/item3.xml><?xml version="1.0" encoding="utf-8"?>
+<p:properties xmlns:p="http://schemas.microsoft.com/office/2006/metadata/properties" xmlns:xsi="http://www.w3.org/2001/XMLSchema-instance" xmlns:pc="http://schemas.microsoft.com/office/infopath/2007/PartnerControls">
+  <documentManagement/>
+</p:properties>
+</file>
+
 <file path=customXml/itemProps1.xml><?xml version="1.0" encoding="utf-8"?>
 <ds:datastoreItem xmlns:ds="http://schemas.openxmlformats.org/officeDocument/2006/customXml" ds:itemID="{1D0F6E45-1E2D-4DB1-A5CB-1AD2C888EDB4}">
   <ds:schemaRefs>
@@ -5940,22 +6053,6 @@
 </file>
 
 <file path=customXml/itemProps2.xml><?xml version="1.0" encoding="utf-8"?>
-<ds:datastoreItem xmlns:ds="http://schemas.openxmlformats.org/officeDocument/2006/customXml" ds:itemID="{6FB99609-54AA-4373-81CB-CB7DA710E073}">
-  <ds:schemaRefs>
-    <ds:schemaRef ds:uri="8c07c512-1ff3-44bd-87df-82ef976e112f"/>
-    <ds:schemaRef ds:uri="http://purl.org/dc/terms/"/>
-    <ds:schemaRef ds:uri="http://schemas.openxmlformats.org/package/2006/metadata/core-properties"/>
-    <ds:schemaRef ds:uri="http://schemas.microsoft.com/office/2006/documentManagement/types"/>
-    <ds:schemaRef ds:uri="http://schemas.microsoft.com/office/infopath/2007/PartnerControls"/>
-    <ds:schemaRef ds:uri="http://purl.org/dc/elements/1.1/"/>
-    <ds:schemaRef ds:uri="http://schemas.microsoft.com/office/2006/metadata/properties"/>
-    <ds:schemaRef ds:uri="http://www.w3.org/XML/1998/namespace"/>
-    <ds:schemaRef ds:uri="http://purl.org/dc/dcmitype/"/>
-  </ds:schemaRefs>
-</ds:datastoreItem>
-</file>
-
-<file path=customXml/itemProps3.xml><?xml version="1.0" encoding="utf-8"?>
 <ds:datastoreItem xmlns:ds="http://schemas.openxmlformats.org/officeDocument/2006/customXml" ds:itemID="{49BD9836-C789-4A7B-B514-29C6143C37CD}">
   <ds:schemaRefs>
     <ds:schemaRef ds:uri="http://schemas.microsoft.com/office/2006/metadata/contentType"/>
@@ -5971,4 +6068,20 @@
     <ds:schemaRef ds:uri="http://schemas.microsoft.com/internal/obd"/>
   </ds:schemaRefs>
 </ds:datastoreItem>
+</file>
+
+<file path=customXml/itemProps3.xml><?xml version="1.0" encoding="utf-8"?>
+<ds:datastoreItem xmlns:ds="http://schemas.openxmlformats.org/officeDocument/2006/customXml" ds:itemID="{6FB99609-54AA-4373-81CB-CB7DA710E073}">
+  <ds:schemaRefs>
+    <ds:schemaRef ds:uri="http://purl.org/dc/elements/1.1/"/>
+    <ds:schemaRef ds:uri="http://schemas.microsoft.com/office/2006/metadata/properties"/>
+    <ds:schemaRef ds:uri="8c07c512-1ff3-44bd-87df-82ef976e112f"/>
+    <ds:schemaRef ds:uri="http://purl.org/dc/terms/"/>
+    <ds:schemaRef ds:uri="http://schemas.openxmlformats.org/package/2006/metadata/core-properties"/>
+    <ds:schemaRef ds:uri="http://schemas.microsoft.com/office/2006/documentManagement/types"/>
+    <ds:schemaRef ds:uri="http://purl.org/dc/dcmitype/"/>
+    <ds:schemaRef ds:uri="http://schemas.microsoft.com/office/infopath/2007/PartnerControls"/>
+    <ds:schemaRef ds:uri="http://www.w3.org/XML/1998/namespace"/>
+  </ds:schemaRefs>
+</ds:datastoreItem>
 </file>
</xml_diff>